<commit_message>
isAdmin fix, search available products UDF,powerpoint
</commit_message>
<xml_diff>
--- a/Second Assignment/DETI STORE.pptx
+++ b/Second Assignment/DETI STORE.pptx
@@ -5,7 +5,7 @@
     <p:sldMasterId id="2147483648" r:id="rId1"/>
   </p:sldMasterIdLst>
   <p:notesMasterIdLst>
-    <p:notesMasterId r:id="rId11"/>
+    <p:notesMasterId r:id="rId12"/>
   </p:notesMasterIdLst>
   <p:sldIdLst>
     <p:sldId id="256" r:id="rId2"/>
@@ -17,6 +17,7 @@
     <p:sldId id="263" r:id="rId8"/>
     <p:sldId id="261" r:id="rId9"/>
     <p:sldId id="264" r:id="rId10"/>
+    <p:sldId id="265" r:id="rId11"/>
   </p:sldIdLst>
   <p:sldSz cx="12192000" cy="6858000"/>
   <p:notesSz cx="6858000" cy="9144000"/>
@@ -115,7 +116,303 @@
       </a:defRPr>
     </a:lvl9pPr>
   </p:defaultTextStyle>
+  <p:extLst>
+    <p:ext uri="{EFAFB233-063F-42B5-8137-9DF3F51BA10A}">
+      <p15:sldGuideLst xmlns:p15="http://schemas.microsoft.com/office/powerpoint/2012/main"/>
+    </p:ext>
+  </p:extLst>
 </p:presentation>
+</file>
+
+<file path=ppt/revisionInfo.xml><?xml version="1.0" encoding="utf-8"?>
+<p1510:revInfo xmlns:a="http://schemas.openxmlformats.org/drawingml/2006/main" xmlns:r="http://schemas.openxmlformats.org/officeDocument/2006/relationships" xmlns:p1510="http://schemas.microsoft.com/office/powerpoint/2015/10/main">
+  <p1510:revLst>
+    <p1510:client id="{0607ED77-764F-4715-A533-1B56A8DC2C86}" v="129" dt="2024-05-30T15:40:36.009"/>
+  </p1510:revLst>
+</p1510:revInfo>
+</file>
+
+<file path=ppt/changesInfos/changesInfo1.xml><?xml version="1.0" encoding="utf-8"?>
+<pc:chgInfo xmlns:a="http://schemas.openxmlformats.org/drawingml/2006/main" xmlns:r="http://schemas.openxmlformats.org/officeDocument/2006/relationships" xmlns:ac="http://schemas.microsoft.com/office/drawing/2013/main/command" xmlns:pc="http://schemas.microsoft.com/office/powerpoint/2013/main/command">
+  <pc:docChgLst>
+    <pc:chgData name="João Paulo" userId="6e73a43065eb75be" providerId="LiveId" clId="{0607ED77-764F-4715-A533-1B56A8DC2C86}"/>
+    <pc:docChg chg="undo custSel addSld modSld">
+      <pc:chgData name="João Paulo" userId="6e73a43065eb75be" providerId="LiveId" clId="{0607ED77-764F-4715-A533-1B56A8DC2C86}" dt="2024-05-30T15:40:43.082" v="1312" actId="1076"/>
+      <pc:docMkLst>
+        <pc:docMk/>
+      </pc:docMkLst>
+      <pc:sldChg chg="modSp mod modAnim">
+        <pc:chgData name="João Paulo" userId="6e73a43065eb75be" providerId="LiveId" clId="{0607ED77-764F-4715-A533-1B56A8DC2C86}" dt="2024-05-30T15:26:50.436" v="815" actId="1076"/>
+        <pc:sldMkLst>
+          <pc:docMk/>
+          <pc:sldMk cId="820245736" sldId="262"/>
+        </pc:sldMkLst>
+        <pc:spChg chg="mod">
+          <ac:chgData name="João Paulo" userId="6e73a43065eb75be" providerId="LiveId" clId="{0607ED77-764F-4715-A533-1B56A8DC2C86}" dt="2024-05-30T15:20:36.749" v="768" actId="14100"/>
+          <ac:spMkLst>
+            <pc:docMk/>
+            <pc:sldMk cId="820245736" sldId="262"/>
+            <ac:spMk id="6" creationId="{03E3E31F-A2FD-7D20-0EAB-A27D38E382F6}"/>
+          </ac:spMkLst>
+        </pc:spChg>
+        <pc:spChg chg="mod">
+          <ac:chgData name="João Paulo" userId="6e73a43065eb75be" providerId="LiveId" clId="{0607ED77-764F-4715-A533-1B56A8DC2C86}" dt="2024-05-30T15:26:35.580" v="812" actId="1076"/>
+          <ac:spMkLst>
+            <pc:docMk/>
+            <pc:sldMk cId="820245736" sldId="262"/>
+            <ac:spMk id="9" creationId="{57B28C23-7273-7912-C4E7-E77F337F7F52}"/>
+          </ac:spMkLst>
+        </pc:spChg>
+        <pc:spChg chg="mod">
+          <ac:chgData name="João Paulo" userId="6e73a43065eb75be" providerId="LiveId" clId="{0607ED77-764F-4715-A533-1B56A8DC2C86}" dt="2024-05-30T15:26:38.962" v="813" actId="1076"/>
+          <ac:spMkLst>
+            <pc:docMk/>
+            <pc:sldMk cId="820245736" sldId="262"/>
+            <ac:spMk id="14" creationId="{F9F95664-2014-B51D-64C7-F161A944A2DC}"/>
+          </ac:spMkLst>
+        </pc:spChg>
+        <pc:spChg chg="mod">
+          <ac:chgData name="João Paulo" userId="6e73a43065eb75be" providerId="LiveId" clId="{0607ED77-764F-4715-A533-1B56A8DC2C86}" dt="2024-05-30T15:26:46.127" v="814" actId="1076"/>
+          <ac:spMkLst>
+            <pc:docMk/>
+            <pc:sldMk cId="820245736" sldId="262"/>
+            <ac:spMk id="17" creationId="{CEEEFAC7-F309-FF1F-B423-E0856D94066B}"/>
+          </ac:spMkLst>
+        </pc:spChg>
+        <pc:spChg chg="mod">
+          <ac:chgData name="João Paulo" userId="6e73a43065eb75be" providerId="LiveId" clId="{0607ED77-764F-4715-A533-1B56A8DC2C86}" dt="2024-05-30T15:26:35.580" v="812" actId="1076"/>
+          <ac:spMkLst>
+            <pc:docMk/>
+            <pc:sldMk cId="820245736" sldId="262"/>
+            <ac:spMk id="19" creationId="{798B9159-B7C6-AD6F-C51B-C589A3F76219}"/>
+          </ac:spMkLst>
+        </pc:spChg>
+        <pc:spChg chg="mod">
+          <ac:chgData name="João Paulo" userId="6e73a43065eb75be" providerId="LiveId" clId="{0607ED77-764F-4715-A533-1B56A8DC2C86}" dt="2024-05-30T15:26:46.127" v="814" actId="1076"/>
+          <ac:spMkLst>
+            <pc:docMk/>
+            <pc:sldMk cId="820245736" sldId="262"/>
+            <ac:spMk id="21" creationId="{2E9B0D7C-1B86-534E-7012-6FE61542B779}"/>
+          </ac:spMkLst>
+        </pc:spChg>
+        <pc:spChg chg="mod">
+          <ac:chgData name="João Paulo" userId="6e73a43065eb75be" providerId="LiveId" clId="{0607ED77-764F-4715-A533-1B56A8DC2C86}" dt="2024-05-30T15:26:38.962" v="813" actId="1076"/>
+          <ac:spMkLst>
+            <pc:docMk/>
+            <pc:sldMk cId="820245736" sldId="262"/>
+            <ac:spMk id="22" creationId="{6F884FD9-C8D7-E72D-A52C-AF5C89CD0F57}"/>
+          </ac:spMkLst>
+        </pc:spChg>
+        <pc:spChg chg="mod">
+          <ac:chgData name="João Paulo" userId="6e73a43065eb75be" providerId="LiveId" clId="{0607ED77-764F-4715-A533-1B56A8DC2C86}" dt="2024-05-30T15:26:50.436" v="815" actId="1076"/>
+          <ac:spMkLst>
+            <pc:docMk/>
+            <pc:sldMk cId="820245736" sldId="262"/>
+            <ac:spMk id="23" creationId="{E7ACB69F-F5DC-3876-97EA-A12CC7732619}"/>
+          </ac:spMkLst>
+        </pc:spChg>
+        <pc:spChg chg="mod">
+          <ac:chgData name="João Paulo" userId="6e73a43065eb75be" providerId="LiveId" clId="{0607ED77-764F-4715-A533-1B56A8DC2C86}" dt="2024-05-30T15:26:50.436" v="815" actId="1076"/>
+          <ac:spMkLst>
+            <pc:docMk/>
+            <pc:sldMk cId="820245736" sldId="262"/>
+            <ac:spMk id="24" creationId="{32DA91FD-2D21-AA69-E86A-5DBE80B5861E}"/>
+          </ac:spMkLst>
+        </pc:spChg>
+      </pc:sldChg>
+      <pc:sldChg chg="addSp delSp modSp mod">
+        <pc:chgData name="João Paulo" userId="6e73a43065eb75be" providerId="LiveId" clId="{0607ED77-764F-4715-A533-1B56A8DC2C86}" dt="2024-05-30T15:27:56.181" v="816" actId="12385"/>
+        <pc:sldMkLst>
+          <pc:docMk/>
+          <pc:sldMk cId="3966565946" sldId="263"/>
+        </pc:sldMkLst>
+        <pc:spChg chg="add del mod">
+          <ac:chgData name="João Paulo" userId="6e73a43065eb75be" providerId="LiveId" clId="{0607ED77-764F-4715-A533-1B56A8DC2C86}" dt="2024-05-30T12:15:07.002" v="60" actId="478"/>
+          <ac:spMkLst>
+            <pc:docMk/>
+            <pc:sldMk cId="3966565946" sldId="263"/>
+            <ac:spMk id="2" creationId="{BF2BDCA0-4945-B79B-1595-50109FC5850F}"/>
+          </ac:spMkLst>
+        </pc:spChg>
+        <pc:spChg chg="add del mod">
+          <ac:chgData name="João Paulo" userId="6e73a43065eb75be" providerId="LiveId" clId="{0607ED77-764F-4715-A533-1B56A8DC2C86}" dt="2024-05-30T12:16:33.282" v="190" actId="478"/>
+          <ac:spMkLst>
+            <pc:docMk/>
+            <pc:sldMk cId="3966565946" sldId="263"/>
+            <ac:spMk id="3" creationId="{988609B1-4C61-5F35-4CF3-08270FAF6A6C}"/>
+          </ac:spMkLst>
+        </pc:spChg>
+        <pc:spChg chg="add del mod">
+          <ac:chgData name="João Paulo" userId="6e73a43065eb75be" providerId="LiveId" clId="{0607ED77-764F-4715-A533-1B56A8DC2C86}" dt="2024-05-30T12:16:32.131" v="188" actId="478"/>
+          <ac:spMkLst>
+            <pc:docMk/>
+            <pc:sldMk cId="3966565946" sldId="263"/>
+            <ac:spMk id="6" creationId="{4260F187-85E0-92A7-75F6-EC274F25CD6F}"/>
+          </ac:spMkLst>
+        </pc:spChg>
+        <pc:spChg chg="add del mod">
+          <ac:chgData name="João Paulo" userId="6e73a43065eb75be" providerId="LiveId" clId="{0607ED77-764F-4715-A533-1B56A8DC2C86}" dt="2024-05-30T12:16:30.718" v="186" actId="478"/>
+          <ac:spMkLst>
+            <pc:docMk/>
+            <pc:sldMk cId="3966565946" sldId="263"/>
+            <ac:spMk id="7" creationId="{3C8687B6-67C4-7412-7864-68471EF870DC}"/>
+          </ac:spMkLst>
+        </pc:spChg>
+        <pc:spChg chg="mod">
+          <ac:chgData name="João Paulo" userId="6e73a43065eb75be" providerId="LiveId" clId="{0607ED77-764F-4715-A533-1B56A8DC2C86}" dt="2024-05-30T12:15:12.023" v="61" actId="20577"/>
+          <ac:spMkLst>
+            <pc:docMk/>
+            <pc:sldMk cId="3966565946" sldId="263"/>
+            <ac:spMk id="10" creationId="{8C799075-5CE4-0DBF-F3B8-C0096CF6C0A6}"/>
+          </ac:spMkLst>
+        </pc:spChg>
+        <pc:spChg chg="add del mod">
+          <ac:chgData name="João Paulo" userId="6e73a43065eb75be" providerId="LiveId" clId="{0607ED77-764F-4715-A533-1B56A8DC2C86}" dt="2024-05-30T12:16:31.406" v="187" actId="478"/>
+          <ac:spMkLst>
+            <pc:docMk/>
+            <pc:sldMk cId="3966565946" sldId="263"/>
+            <ac:spMk id="11" creationId="{EF160F23-4580-CD92-25CC-2CC3B79224AF}"/>
+          </ac:spMkLst>
+        </pc:spChg>
+        <pc:graphicFrameChg chg="add mod modGraphic">
+          <ac:chgData name="João Paulo" userId="6e73a43065eb75be" providerId="LiveId" clId="{0607ED77-764F-4715-A533-1B56A8DC2C86}" dt="2024-05-30T15:27:56.181" v="816" actId="12385"/>
+          <ac:graphicFrameMkLst>
+            <pc:docMk/>
+            <pc:sldMk cId="3966565946" sldId="263"/>
+            <ac:graphicFrameMk id="12" creationId="{E751F150-472D-C452-F12E-E269FB39C2DD}"/>
+          </ac:graphicFrameMkLst>
+        </pc:graphicFrameChg>
+      </pc:sldChg>
+      <pc:sldChg chg="addSp delSp modSp new mod">
+        <pc:chgData name="João Paulo" userId="6e73a43065eb75be" providerId="LiveId" clId="{0607ED77-764F-4715-A533-1B56A8DC2C86}" dt="2024-05-30T15:40:43.082" v="1312" actId="1076"/>
+        <pc:sldMkLst>
+          <pc:docMk/>
+          <pc:sldMk cId="4199402213" sldId="265"/>
+        </pc:sldMkLst>
+        <pc:spChg chg="del">
+          <ac:chgData name="João Paulo" userId="6e73a43065eb75be" providerId="LiveId" clId="{0607ED77-764F-4715-A533-1B56A8DC2C86}" dt="2024-05-30T15:28:45.029" v="819" actId="478"/>
+          <ac:spMkLst>
+            <pc:docMk/>
+            <pc:sldMk cId="4199402213" sldId="265"/>
+            <ac:spMk id="2" creationId="{9670F405-AF68-A85E-5DAE-9EDC6F02D62D}"/>
+          </ac:spMkLst>
+        </pc:spChg>
+        <pc:spChg chg="del">
+          <ac:chgData name="João Paulo" userId="6e73a43065eb75be" providerId="LiveId" clId="{0607ED77-764F-4715-A533-1B56A8DC2C86}" dt="2024-05-30T15:28:44.426" v="818" actId="478"/>
+          <ac:spMkLst>
+            <pc:docMk/>
+            <pc:sldMk cId="4199402213" sldId="265"/>
+            <ac:spMk id="3" creationId="{6790C296-EE07-82F9-3DC2-122A0F64C793}"/>
+          </ac:spMkLst>
+        </pc:spChg>
+        <pc:spChg chg="add mod">
+          <ac:chgData name="João Paulo" userId="6e73a43065eb75be" providerId="LiveId" clId="{0607ED77-764F-4715-A533-1B56A8DC2C86}" dt="2024-05-30T15:28:45.848" v="820"/>
+          <ac:spMkLst>
+            <pc:docMk/>
+            <pc:sldMk cId="4199402213" sldId="265"/>
+            <ac:spMk id="5" creationId="{0B1B5F8E-21EC-6B56-A0BC-795C71AE2DA1}"/>
+          </ac:spMkLst>
+        </pc:spChg>
+        <pc:spChg chg="add mod">
+          <ac:chgData name="João Paulo" userId="6e73a43065eb75be" providerId="LiveId" clId="{0607ED77-764F-4715-A533-1B56A8DC2C86}" dt="2024-05-30T15:28:58.426" v="832" actId="20577"/>
+          <ac:spMkLst>
+            <pc:docMk/>
+            <pc:sldMk cId="4199402213" sldId="265"/>
+            <ac:spMk id="6" creationId="{CBBD47C0-781C-A979-0314-38AD103FD341}"/>
+          </ac:spMkLst>
+        </pc:spChg>
+        <pc:spChg chg="add mod">
+          <ac:chgData name="João Paulo" userId="6e73a43065eb75be" providerId="LiveId" clId="{0607ED77-764F-4715-A533-1B56A8DC2C86}" dt="2024-05-30T15:28:45.848" v="820"/>
+          <ac:spMkLst>
+            <pc:docMk/>
+            <pc:sldMk cId="4199402213" sldId="265"/>
+            <ac:spMk id="7" creationId="{7C02D9FB-1246-AE5B-C297-46B74FF9F88F}"/>
+          </ac:spMkLst>
+        </pc:spChg>
+        <pc:spChg chg="add del mod">
+          <ac:chgData name="João Paulo" userId="6e73a43065eb75be" providerId="LiveId" clId="{0607ED77-764F-4715-A533-1B56A8DC2C86}" dt="2024-05-30T15:29:06.105" v="835"/>
+          <ac:spMkLst>
+            <pc:docMk/>
+            <pc:sldMk cId="4199402213" sldId="265"/>
+            <ac:spMk id="8" creationId="{CB519ECA-9D01-9D06-2664-2E4DD756AC86}"/>
+          </ac:spMkLst>
+        </pc:spChg>
+        <pc:spChg chg="add del mod">
+          <ac:chgData name="João Paulo" userId="6e73a43065eb75be" providerId="LiveId" clId="{0607ED77-764F-4715-A533-1B56A8DC2C86}" dt="2024-05-30T15:39:50.938" v="1301" actId="478"/>
+          <ac:spMkLst>
+            <pc:docMk/>
+            <pc:sldMk cId="4199402213" sldId="265"/>
+            <ac:spMk id="9" creationId="{8A3619EC-3A4F-E3B3-1AA8-61B72D8AF93F}"/>
+          </ac:spMkLst>
+        </pc:spChg>
+        <pc:spChg chg="add mod">
+          <ac:chgData name="João Paulo" userId="6e73a43065eb75be" providerId="LiveId" clId="{0607ED77-764F-4715-A533-1B56A8DC2C86}" dt="2024-05-30T15:40:24.113" v="1308" actId="1076"/>
+          <ac:spMkLst>
+            <pc:docMk/>
+            <pc:sldMk cId="4199402213" sldId="265"/>
+            <ac:spMk id="10" creationId="{4BA61695-1564-6BF7-3AEB-AFA36313FC9F}"/>
+          </ac:spMkLst>
+        </pc:spChg>
+        <pc:spChg chg="add mod">
+          <ac:chgData name="João Paulo" userId="6e73a43065eb75be" providerId="LiveId" clId="{0607ED77-764F-4715-A533-1B56A8DC2C86}" dt="2024-05-30T15:40:43.082" v="1312" actId="1076"/>
+          <ac:spMkLst>
+            <pc:docMk/>
+            <pc:sldMk cId="4199402213" sldId="265"/>
+            <ac:spMk id="12" creationId="{6E1D211C-BE23-FE0A-223A-7B463891DA3A}"/>
+          </ac:spMkLst>
+        </pc:spChg>
+        <pc:spChg chg="add mod">
+          <ac:chgData name="João Paulo" userId="6e73a43065eb75be" providerId="LiveId" clId="{0607ED77-764F-4715-A533-1B56A8DC2C86}" dt="2024-05-30T15:40:38.611" v="1311" actId="1076"/>
+          <ac:spMkLst>
+            <pc:docMk/>
+            <pc:sldMk cId="4199402213" sldId="265"/>
+            <ac:spMk id="14" creationId="{0C3B00C7-63C4-DA66-7B6D-DC0A9C78515F}"/>
+          </ac:spMkLst>
+        </pc:spChg>
+        <pc:picChg chg="add mod">
+          <ac:chgData name="João Paulo" userId="6e73a43065eb75be" providerId="LiveId" clId="{0607ED77-764F-4715-A533-1B56A8DC2C86}" dt="2024-05-30T15:40:20.318" v="1306" actId="1076"/>
+          <ac:picMkLst>
+            <pc:docMk/>
+            <pc:sldMk cId="4199402213" sldId="265"/>
+            <ac:picMk id="11" creationId="{9E893F9F-58D9-93E1-688A-1254D626A6A5}"/>
+          </ac:picMkLst>
+        </pc:picChg>
+        <pc:picChg chg="add mod">
+          <ac:chgData name="João Paulo" userId="6e73a43065eb75be" providerId="LiveId" clId="{0607ED77-764F-4715-A533-1B56A8DC2C86}" dt="2024-05-30T15:40:36.009" v="1310" actId="1076"/>
+          <ac:picMkLst>
+            <pc:docMk/>
+            <pc:sldMk cId="4199402213" sldId="265"/>
+            <ac:picMk id="13" creationId="{7E82F30D-1C78-8756-6262-48FA7F80B77F}"/>
+          </ac:picMkLst>
+        </pc:picChg>
+        <pc:picChg chg="add mod">
+          <ac:chgData name="João Paulo" userId="6e73a43065eb75be" providerId="LiveId" clId="{0607ED77-764F-4715-A533-1B56A8DC2C86}" dt="2024-05-30T15:40:22.173" v="1307" actId="1076"/>
+          <ac:picMkLst>
+            <pc:docMk/>
+            <pc:sldMk cId="4199402213" sldId="265"/>
+            <ac:picMk id="1026" creationId="{6EEC69B4-BCDC-E428-FFEB-7025C7F53731}"/>
+          </ac:picMkLst>
+        </pc:picChg>
+        <pc:picChg chg="add">
+          <ac:chgData name="João Paulo" userId="6e73a43065eb75be" providerId="LiveId" clId="{0607ED77-764F-4715-A533-1B56A8DC2C86}" dt="2024-05-30T15:36:48.847" v="1116"/>
+          <ac:picMkLst>
+            <pc:docMk/>
+            <pc:sldMk cId="4199402213" sldId="265"/>
+            <ac:picMk id="1028" creationId="{E2FD798A-6C82-8D52-7774-9190863948F5}"/>
+          </ac:picMkLst>
+        </pc:picChg>
+        <pc:cxnChg chg="add mod">
+          <ac:chgData name="João Paulo" userId="6e73a43065eb75be" providerId="LiveId" clId="{0607ED77-764F-4715-A533-1B56A8DC2C86}" dt="2024-05-30T15:28:45.848" v="820"/>
+          <ac:cxnSpMkLst>
+            <pc:docMk/>
+            <pc:sldMk cId="4199402213" sldId="265"/>
+            <ac:cxnSpMk id="4" creationId="{DBAB30FB-450F-F31E-8DAD-B0AFEDFD4169}"/>
+          </ac:cxnSpMkLst>
+        </pc:cxnChg>
+      </pc:sldChg>
+    </pc:docChg>
+  </pc:docChgLst>
+</pc:chgInfo>
 </file>
 
 <file path=ppt/notesMasters/notesMaster1.xml><?xml version="1.0" encoding="utf-8"?>
@@ -200,7 +497,7 @@
           <a:p>
             <a:fld id="{E649F7FE-F02B-45D5-B08A-284AAA8511FB}" type="datetimeFigureOut">
               <a:rPr lang="en-US" smtClean="0"/>
-              <a:t>5/29/2024</a:t>
+              <a:t>5/30/2024</a:t>
             </a:fld>
             <a:endParaRPr lang="en-US"/>
           </a:p>
@@ -709,7 +1006,7 @@
           <a:p>
             <a:fld id="{730F7551-AEE9-4758-8C90-FB0961C5E981}" type="datetimeFigureOut">
               <a:rPr lang="en-US" smtClean="0"/>
-              <a:t>5/29/2024</a:t>
+              <a:t>5/30/2024</a:t>
             </a:fld>
             <a:endParaRPr lang="en-US"/>
           </a:p>
@@ -907,7 +1204,7 @@
           <a:p>
             <a:fld id="{730F7551-AEE9-4758-8C90-FB0961C5E981}" type="datetimeFigureOut">
               <a:rPr lang="en-US" smtClean="0"/>
-              <a:t>5/29/2024</a:t>
+              <a:t>5/30/2024</a:t>
             </a:fld>
             <a:endParaRPr lang="en-US"/>
           </a:p>
@@ -1115,7 +1412,7 @@
           <a:p>
             <a:fld id="{730F7551-AEE9-4758-8C90-FB0961C5E981}" type="datetimeFigureOut">
               <a:rPr lang="en-US" smtClean="0"/>
-              <a:t>5/29/2024</a:t>
+              <a:t>5/30/2024</a:t>
             </a:fld>
             <a:endParaRPr lang="en-US"/>
           </a:p>
@@ -1313,7 +1610,7 @@
           <a:p>
             <a:fld id="{730F7551-AEE9-4758-8C90-FB0961C5E981}" type="datetimeFigureOut">
               <a:rPr lang="en-US" smtClean="0"/>
-              <a:t>5/29/2024</a:t>
+              <a:t>5/30/2024</a:t>
             </a:fld>
             <a:endParaRPr lang="en-US"/>
           </a:p>
@@ -1588,7 +1885,7 @@
           <a:p>
             <a:fld id="{730F7551-AEE9-4758-8C90-FB0961C5E981}" type="datetimeFigureOut">
               <a:rPr lang="en-US" smtClean="0"/>
-              <a:t>5/29/2024</a:t>
+              <a:t>5/30/2024</a:t>
             </a:fld>
             <a:endParaRPr lang="en-US"/>
           </a:p>
@@ -1853,7 +2150,7 @@
           <a:p>
             <a:fld id="{730F7551-AEE9-4758-8C90-FB0961C5E981}" type="datetimeFigureOut">
               <a:rPr lang="en-US" smtClean="0"/>
-              <a:t>5/29/2024</a:t>
+              <a:t>5/30/2024</a:t>
             </a:fld>
             <a:endParaRPr lang="en-US"/>
           </a:p>
@@ -2265,7 +2562,7 @@
           <a:p>
             <a:fld id="{730F7551-AEE9-4758-8C90-FB0961C5E981}" type="datetimeFigureOut">
               <a:rPr lang="en-US" smtClean="0"/>
-              <a:t>5/29/2024</a:t>
+              <a:t>5/30/2024</a:t>
             </a:fld>
             <a:endParaRPr lang="en-US"/>
           </a:p>
@@ -2406,7 +2703,7 @@
           <a:p>
             <a:fld id="{730F7551-AEE9-4758-8C90-FB0961C5E981}" type="datetimeFigureOut">
               <a:rPr lang="en-US" smtClean="0"/>
-              <a:t>5/29/2024</a:t>
+              <a:t>5/30/2024</a:t>
             </a:fld>
             <a:endParaRPr lang="en-US"/>
           </a:p>
@@ -2519,7 +2816,7 @@
           <a:p>
             <a:fld id="{730F7551-AEE9-4758-8C90-FB0961C5E981}" type="datetimeFigureOut">
               <a:rPr lang="en-US" smtClean="0"/>
-              <a:t>5/29/2024</a:t>
+              <a:t>5/30/2024</a:t>
             </a:fld>
             <a:endParaRPr lang="en-US"/>
           </a:p>
@@ -2830,7 +3127,7 @@
           <a:p>
             <a:fld id="{730F7551-AEE9-4758-8C90-FB0961C5E981}" type="datetimeFigureOut">
               <a:rPr lang="en-US" smtClean="0"/>
-              <a:t>5/29/2024</a:t>
+              <a:t>5/30/2024</a:t>
             </a:fld>
             <a:endParaRPr lang="en-US"/>
           </a:p>
@@ -3118,7 +3415,7 @@
           <a:p>
             <a:fld id="{730F7551-AEE9-4758-8C90-FB0961C5E981}" type="datetimeFigureOut">
               <a:rPr lang="en-US" smtClean="0"/>
-              <a:t>5/29/2024</a:t>
+              <a:t>5/30/2024</a:t>
             </a:fld>
             <a:endParaRPr lang="en-US"/>
           </a:p>
@@ -3359,7 +3656,7 @@
           <a:p>
             <a:fld id="{730F7551-AEE9-4758-8C90-FB0961C5E981}" type="datetimeFigureOut">
               <a:rPr lang="en-US" smtClean="0"/>
-              <a:t>5/29/2024</a:t>
+              <a:t>5/30/2024</a:t>
             </a:fld>
             <a:endParaRPr lang="en-US"/>
           </a:p>
@@ -4159,6 +4456,847 @@
 </p:sld>
 </file>
 
+<file path=ppt/slides/slide10.xml><?xml version="1.0" encoding="utf-8"?>
+<p:sld xmlns:a="http://schemas.openxmlformats.org/drawingml/2006/main" xmlns:r="http://schemas.openxmlformats.org/officeDocument/2006/relationships" xmlns:p="http://schemas.openxmlformats.org/presentationml/2006/main">
+  <p:cSld>
+    <p:spTree>
+      <p:nvGrpSpPr>
+        <p:cNvPr id="1" name=""/>
+        <p:cNvGrpSpPr/>
+        <p:nvPr/>
+      </p:nvGrpSpPr>
+      <p:grpSpPr>
+        <a:xfrm>
+          <a:off x="0" y="0"/>
+          <a:ext cx="0" cy="0"/>
+          <a:chOff x="0" y="0"/>
+          <a:chExt cx="0" cy="0"/>
+        </a:xfrm>
+      </p:grpSpPr>
+      <p:cxnSp>
+        <p:nvCxnSpPr>
+          <p:cNvPr id="4" name="Straight Connector 3">
+            <a:extLst>
+              <a:ext uri="{FF2B5EF4-FFF2-40B4-BE49-F238E27FC236}">
+                <a16:creationId xmlns:a16="http://schemas.microsoft.com/office/drawing/2014/main" id="{DBAB30FB-450F-F31E-8DAD-B0AFEDFD4169}"/>
+              </a:ext>
+            </a:extLst>
+          </p:cNvPr>
+          <p:cNvCxnSpPr/>
+          <p:nvPr/>
+        </p:nvCxnSpPr>
+        <p:spPr bwMode="auto">
+          <a:xfrm>
+            <a:off x="487250" y="6105480"/>
+            <a:ext cx="11217499" cy="0"/>
+          </a:xfrm>
+          <a:prstGeom prst="line">
+            <a:avLst/>
+          </a:prstGeom>
+          <a:noFill/>
+          <a:ln w="19050" cap="flat" cmpd="sng" algn="ctr">
+            <a:solidFill>
+              <a:srgbClr val="333333"/>
+            </a:solidFill>
+            <a:prstDash val="solid"/>
+            <a:round/>
+            <a:headEnd type="none" w="med" len="med"/>
+            <a:tailEnd type="none" w="med" len="med"/>
+          </a:ln>
+          <a:effectLst/>
+          <a:extLst>
+            <a:ext uri="{909E8E84-426E-40DD-AFC4-6F175D3DCCD1}">
+              <a14:hiddenFill xmlns:a14="http://schemas.microsoft.com/office/drawing/2010/main">
+                <a:solidFill>
+                  <a:schemeClr val="accent1"/>
+                </a:solidFill>
+              </a14:hiddenFill>
+            </a:ext>
+            <a:ext uri="{AF507438-7753-43E0-B8FC-AC1667EBCBE1}">
+              <a14:hiddenEffects xmlns:a14="http://schemas.microsoft.com/office/drawing/2010/main">
+                <a:effectLst>
+                  <a:outerShdw dist="35921" dir="2700000" algn="ctr" rotWithShape="0">
+                    <a:schemeClr val="bg2"/>
+                  </a:outerShdw>
+                </a:effectLst>
+              </a14:hiddenEffects>
+            </a:ext>
+          </a:extLst>
+        </p:spPr>
+      </p:cxnSp>
+      <p:sp>
+        <p:nvSpPr>
+          <p:cNvPr id="5" name="Foliennummernplatzhalter 1">
+            <a:extLst>
+              <a:ext uri="{FF2B5EF4-FFF2-40B4-BE49-F238E27FC236}">
+                <a16:creationId xmlns:a16="http://schemas.microsoft.com/office/drawing/2014/main" id="{0B1B5F8E-21EC-6B56-A0BC-795C71AE2DA1}"/>
+              </a:ext>
+            </a:extLst>
+          </p:cNvPr>
+          <p:cNvSpPr txBox="1">
+            <a:spLocks/>
+          </p:cNvSpPr>
+          <p:nvPr/>
+        </p:nvSpPr>
+        <p:spPr>
+          <a:xfrm>
+            <a:off x="537211" y="6224749"/>
+            <a:ext cx="2671668" cy="307776"/>
+          </a:xfrm>
+          <a:prstGeom prst="rect">
+            <a:avLst/>
+          </a:prstGeom>
+        </p:spPr>
+        <p:txBody>
+          <a:bodyPr/>
+          <a:lstStyle>
+            <a:defPPr>
+              <a:defRPr lang="en-US"/>
+            </a:defPPr>
+            <a:lvl1pPr marL="0" algn="l" defTabSz="914400" rtl="0" eaLnBrk="1" latinLnBrk="0" hangingPunct="1">
+              <a:defRPr sz="1800" kern="1200">
+                <a:solidFill>
+                  <a:schemeClr val="tx1"/>
+                </a:solidFill>
+                <a:latin typeface="+mn-lt"/>
+                <a:ea typeface="+mn-ea"/>
+                <a:cs typeface="+mn-cs"/>
+              </a:defRPr>
+            </a:lvl1pPr>
+            <a:lvl2pPr marL="457200" algn="l" defTabSz="914400" rtl="0" eaLnBrk="1" latinLnBrk="0" hangingPunct="1">
+              <a:defRPr sz="1800" kern="1200">
+                <a:solidFill>
+                  <a:schemeClr val="tx1"/>
+                </a:solidFill>
+                <a:latin typeface="+mn-lt"/>
+                <a:ea typeface="+mn-ea"/>
+                <a:cs typeface="+mn-cs"/>
+              </a:defRPr>
+            </a:lvl2pPr>
+            <a:lvl3pPr marL="914400" algn="l" defTabSz="914400" rtl="0" eaLnBrk="1" latinLnBrk="0" hangingPunct="1">
+              <a:defRPr sz="1800" kern="1200">
+                <a:solidFill>
+                  <a:schemeClr val="tx1"/>
+                </a:solidFill>
+                <a:latin typeface="+mn-lt"/>
+                <a:ea typeface="+mn-ea"/>
+                <a:cs typeface="+mn-cs"/>
+              </a:defRPr>
+            </a:lvl3pPr>
+            <a:lvl4pPr marL="1371600" algn="l" defTabSz="914400" rtl="0" eaLnBrk="1" latinLnBrk="0" hangingPunct="1">
+              <a:defRPr sz="1800" kern="1200">
+                <a:solidFill>
+                  <a:schemeClr val="tx1"/>
+                </a:solidFill>
+                <a:latin typeface="+mn-lt"/>
+                <a:ea typeface="+mn-ea"/>
+                <a:cs typeface="+mn-cs"/>
+              </a:defRPr>
+            </a:lvl4pPr>
+            <a:lvl5pPr marL="1828800" algn="l" defTabSz="914400" rtl="0" eaLnBrk="1" latinLnBrk="0" hangingPunct="1">
+              <a:defRPr sz="1800" kern="1200">
+                <a:solidFill>
+                  <a:schemeClr val="tx1"/>
+                </a:solidFill>
+                <a:latin typeface="+mn-lt"/>
+                <a:ea typeface="+mn-ea"/>
+                <a:cs typeface="+mn-cs"/>
+              </a:defRPr>
+            </a:lvl5pPr>
+            <a:lvl6pPr marL="2286000" algn="l" defTabSz="914400" rtl="0" eaLnBrk="1" latinLnBrk="0" hangingPunct="1">
+              <a:defRPr sz="1800" kern="1200">
+                <a:solidFill>
+                  <a:schemeClr val="tx1"/>
+                </a:solidFill>
+                <a:latin typeface="+mn-lt"/>
+                <a:ea typeface="+mn-ea"/>
+                <a:cs typeface="+mn-cs"/>
+              </a:defRPr>
+            </a:lvl6pPr>
+            <a:lvl7pPr marL="2743200" algn="l" defTabSz="914400" rtl="0" eaLnBrk="1" latinLnBrk="0" hangingPunct="1">
+              <a:defRPr sz="1800" kern="1200">
+                <a:solidFill>
+                  <a:schemeClr val="tx1"/>
+                </a:solidFill>
+                <a:latin typeface="+mn-lt"/>
+                <a:ea typeface="+mn-ea"/>
+                <a:cs typeface="+mn-cs"/>
+              </a:defRPr>
+            </a:lvl7pPr>
+            <a:lvl8pPr marL="3200400" algn="l" defTabSz="914400" rtl="0" eaLnBrk="1" latinLnBrk="0" hangingPunct="1">
+              <a:defRPr sz="1800" kern="1200">
+                <a:solidFill>
+                  <a:schemeClr val="tx1"/>
+                </a:solidFill>
+                <a:latin typeface="+mn-lt"/>
+                <a:ea typeface="+mn-ea"/>
+                <a:cs typeface="+mn-cs"/>
+              </a:defRPr>
+            </a:lvl8pPr>
+            <a:lvl9pPr marL="3657600" algn="l" defTabSz="914400" rtl="0" eaLnBrk="1" latinLnBrk="0" hangingPunct="1">
+              <a:defRPr sz="1800" kern="1200">
+                <a:solidFill>
+                  <a:schemeClr val="tx1"/>
+                </a:solidFill>
+                <a:latin typeface="+mn-lt"/>
+                <a:ea typeface="+mn-ea"/>
+                <a:cs typeface="+mn-cs"/>
+              </a:defRPr>
+            </a:lvl9pPr>
+          </a:lstStyle>
+          <a:p>
+            <a:pPr>
+              <a:spcBef>
+                <a:spcPct val="50000"/>
+              </a:spcBef>
+              <a:spcAft>
+                <a:spcPct val="0"/>
+              </a:spcAft>
+            </a:pPr>
+            <a:r>
+              <a:rPr lang="en-US" sz="1400" dirty="0"/>
+              <a:t>BD 2023-2024</a:t>
+            </a:r>
+          </a:p>
+        </p:txBody>
+      </p:sp>
+      <p:sp>
+        <p:nvSpPr>
+          <p:cNvPr id="6" name="Title 1">
+            <a:extLst>
+              <a:ext uri="{FF2B5EF4-FFF2-40B4-BE49-F238E27FC236}">
+                <a16:creationId xmlns:a16="http://schemas.microsoft.com/office/drawing/2014/main" id="{CBBD47C0-781C-A979-0314-38AD103FD341}"/>
+              </a:ext>
+            </a:extLst>
+          </p:cNvPr>
+          <p:cNvSpPr>
+            <a:spLocks noGrp="1"/>
+          </p:cNvSpPr>
+          <p:nvPr>
+            <p:ph type="title"/>
+          </p:nvPr>
+        </p:nvSpPr>
+        <p:spPr>
+          <a:xfrm>
+            <a:off x="838200" y="365125"/>
+            <a:ext cx="10515600" cy="1325563"/>
+          </a:xfrm>
+        </p:spPr>
+        <p:txBody>
+          <a:bodyPr/>
+          <a:lstStyle/>
+          <a:p>
+            <a:r>
+              <a:rPr lang="pt-PT" b="1" dirty="0"/>
+              <a:t>Future </a:t>
+            </a:r>
+            <a:r>
+              <a:rPr lang="pt-PT" b="1" dirty="0" err="1"/>
+              <a:t>Work</a:t>
+            </a:r>
+            <a:endParaRPr lang="en-US" b="1" dirty="0"/>
+          </a:p>
+        </p:txBody>
+      </p:sp>
+      <p:sp>
+        <p:nvSpPr>
+          <p:cNvPr id="7" name="Rectangle 2">
+            <a:extLst>
+              <a:ext uri="{FF2B5EF4-FFF2-40B4-BE49-F238E27FC236}">
+                <a16:creationId xmlns:a16="http://schemas.microsoft.com/office/drawing/2014/main" id="{7C02D9FB-1246-AE5B-C297-46B74FF9F88F}"/>
+              </a:ext>
+            </a:extLst>
+          </p:cNvPr>
+          <p:cNvSpPr txBox="1">
+            <a:spLocks noChangeArrowheads="1"/>
+          </p:cNvSpPr>
+          <p:nvPr/>
+        </p:nvSpPr>
+        <p:spPr bwMode="auto">
+          <a:xfrm>
+            <a:off x="1063943" y="1259801"/>
+            <a:ext cx="1717357" cy="738664"/>
+          </a:xfrm>
+          <a:prstGeom prst="rect">
+            <a:avLst/>
+          </a:prstGeom>
+          <a:noFill/>
+          <a:ln>
+            <a:noFill/>
+          </a:ln>
+          <a:effectLst/>
+        </p:spPr>
+        <p:txBody>
+          <a:bodyPr vert="horz" wrap="square" lIns="0" tIns="0" rIns="0" bIns="0" numCol="1" anchor="t" anchorCtr="0" compatLnSpc="1">
+            <a:prstTxWarp prst="textNoShape">
+              <a:avLst/>
+            </a:prstTxWarp>
+            <a:spAutoFit/>
+          </a:bodyPr>
+          <a:lstStyle>
+            <a:lvl1pPr marL="0" indent="0" algn="l" defTabSz="504000" rtl="0" eaLnBrk="1" fontAlgn="base" hangingPunct="1">
+              <a:spcBef>
+                <a:spcPct val="0"/>
+              </a:spcBef>
+              <a:spcAft>
+                <a:spcPct val="0"/>
+              </a:spcAft>
+              <a:defRPr sz="2400" b="1">
+                <a:solidFill>
+                  <a:schemeClr val="tx1"/>
+                </a:solidFill>
+                <a:latin typeface="+mj-lt"/>
+                <a:ea typeface="+mj-ea"/>
+                <a:cs typeface="+mj-cs"/>
+              </a:defRPr>
+            </a:lvl1pPr>
+            <a:lvl2pPr algn="l" rtl="0" eaLnBrk="1" fontAlgn="base" hangingPunct="1">
+              <a:spcBef>
+                <a:spcPct val="0"/>
+              </a:spcBef>
+              <a:spcAft>
+                <a:spcPct val="0"/>
+              </a:spcAft>
+              <a:defRPr sz="2400" b="1">
+                <a:solidFill>
+                  <a:schemeClr val="tx1"/>
+                </a:solidFill>
+                <a:latin typeface="Frutiger LT Com 45 Light" pitchFamily="34" charset="0"/>
+              </a:defRPr>
+            </a:lvl2pPr>
+            <a:lvl3pPr algn="l" rtl="0" eaLnBrk="1" fontAlgn="base" hangingPunct="1">
+              <a:spcBef>
+                <a:spcPct val="0"/>
+              </a:spcBef>
+              <a:spcAft>
+                <a:spcPct val="0"/>
+              </a:spcAft>
+              <a:defRPr sz="2400" b="1">
+                <a:solidFill>
+                  <a:schemeClr val="tx1"/>
+                </a:solidFill>
+                <a:latin typeface="Frutiger LT Com 45 Light" pitchFamily="34" charset="0"/>
+              </a:defRPr>
+            </a:lvl3pPr>
+            <a:lvl4pPr algn="l" rtl="0" eaLnBrk="1" fontAlgn="base" hangingPunct="1">
+              <a:spcBef>
+                <a:spcPct val="0"/>
+              </a:spcBef>
+              <a:spcAft>
+                <a:spcPct val="0"/>
+              </a:spcAft>
+              <a:defRPr sz="2400" b="1">
+                <a:solidFill>
+                  <a:schemeClr val="tx1"/>
+                </a:solidFill>
+                <a:latin typeface="Frutiger LT Com 45 Light" pitchFamily="34" charset="0"/>
+              </a:defRPr>
+            </a:lvl4pPr>
+            <a:lvl5pPr algn="l" rtl="0" eaLnBrk="1" fontAlgn="base" hangingPunct="1">
+              <a:spcBef>
+                <a:spcPct val="0"/>
+              </a:spcBef>
+              <a:spcAft>
+                <a:spcPct val="0"/>
+              </a:spcAft>
+              <a:defRPr sz="2400" b="1">
+                <a:solidFill>
+                  <a:schemeClr val="tx1"/>
+                </a:solidFill>
+                <a:latin typeface="Frutiger LT Com 45 Light" pitchFamily="34" charset="0"/>
+              </a:defRPr>
+            </a:lvl5pPr>
+            <a:lvl6pPr marL="457200" algn="l" rtl="0" eaLnBrk="1" fontAlgn="base" hangingPunct="1">
+              <a:spcBef>
+                <a:spcPct val="0"/>
+              </a:spcBef>
+              <a:spcAft>
+                <a:spcPct val="0"/>
+              </a:spcAft>
+              <a:defRPr sz="2400" b="1">
+                <a:solidFill>
+                  <a:schemeClr val="tx1"/>
+                </a:solidFill>
+                <a:latin typeface="Frutiger LT Com 45 Light" pitchFamily="34" charset="0"/>
+              </a:defRPr>
+            </a:lvl6pPr>
+            <a:lvl7pPr marL="914400" algn="l" rtl="0" eaLnBrk="1" fontAlgn="base" hangingPunct="1">
+              <a:spcBef>
+                <a:spcPct val="0"/>
+              </a:spcBef>
+              <a:spcAft>
+                <a:spcPct val="0"/>
+              </a:spcAft>
+              <a:defRPr sz="2400" b="1">
+                <a:solidFill>
+                  <a:schemeClr val="tx1"/>
+                </a:solidFill>
+                <a:latin typeface="Frutiger LT Com 45 Light" pitchFamily="34" charset="0"/>
+              </a:defRPr>
+            </a:lvl7pPr>
+            <a:lvl8pPr marL="1371600" algn="l" rtl="0" eaLnBrk="1" fontAlgn="base" hangingPunct="1">
+              <a:spcBef>
+                <a:spcPct val="0"/>
+              </a:spcBef>
+              <a:spcAft>
+                <a:spcPct val="0"/>
+              </a:spcAft>
+              <a:defRPr sz="2400" b="1">
+                <a:solidFill>
+                  <a:schemeClr val="tx1"/>
+                </a:solidFill>
+                <a:latin typeface="Frutiger LT Com 45 Light" pitchFamily="34" charset="0"/>
+              </a:defRPr>
+            </a:lvl8pPr>
+            <a:lvl9pPr marL="1828800" algn="l" rtl="0" eaLnBrk="1" fontAlgn="base" hangingPunct="1">
+              <a:spcBef>
+                <a:spcPct val="0"/>
+              </a:spcBef>
+              <a:spcAft>
+                <a:spcPct val="0"/>
+              </a:spcAft>
+              <a:defRPr sz="2400" b="1">
+                <a:solidFill>
+                  <a:schemeClr val="tx1"/>
+                </a:solidFill>
+                <a:latin typeface="Frutiger LT Com 45 Light" pitchFamily="34" charset="0"/>
+              </a:defRPr>
+            </a:lvl9pPr>
+          </a:lstStyle>
+          <a:p>
+            <a:r>
+              <a:rPr lang="en-US" kern="0" dirty="0">
+                <a:solidFill>
+                  <a:srgbClr val="50B400"/>
+                </a:solidFill>
+              </a:rPr>
+              <a:t>DETI Store</a:t>
+            </a:r>
+          </a:p>
+          <a:p>
+            <a:endParaRPr lang="en-US" kern="0" dirty="0">
+              <a:solidFill>
+                <a:srgbClr val="50B400"/>
+              </a:solidFill>
+            </a:endParaRPr>
+          </a:p>
+        </p:txBody>
+      </p:sp>
+      <p:pic>
+        <p:nvPicPr>
+          <p:cNvPr id="1026" name="Picture 2">
+            <a:extLst>
+              <a:ext uri="{FF2B5EF4-FFF2-40B4-BE49-F238E27FC236}">
+                <a16:creationId xmlns:a16="http://schemas.microsoft.com/office/drawing/2014/main" id="{6EEC69B4-BCDC-E428-FFEB-7025C7F53731}"/>
+              </a:ext>
+            </a:extLst>
+          </p:cNvPr>
+          <p:cNvPicPr>
+            <a:picLocks noChangeAspect="1" noChangeArrowheads="1"/>
+          </p:cNvPicPr>
+          <p:nvPr/>
+        </p:nvPicPr>
+        <p:blipFill>
+          <a:blip r:embed="rId2">
+            <a:extLst>
+              <a:ext uri="{28A0092B-C50C-407E-A947-70E740481C1C}">
+                <a14:useLocalDpi xmlns:a14="http://schemas.microsoft.com/office/drawing/2010/main" val="0"/>
+              </a:ext>
+            </a:extLst>
+          </a:blip>
+          <a:srcRect/>
+          <a:stretch/>
+        </p:blipFill>
+        <p:spPr bwMode="auto">
+          <a:xfrm>
+            <a:off x="5164280" y="2339462"/>
+            <a:ext cx="1863437" cy="1863437"/>
+          </a:xfrm>
+          <a:prstGeom prst="ellipse">
+            <a:avLst/>
+          </a:prstGeom>
+          <a:ln w="3175" cap="rnd">
+            <a:solidFill>
+              <a:srgbClr val="333333"/>
+            </a:solidFill>
+          </a:ln>
+          <a:effectLst>
+            <a:outerShdw blurRad="381000" dir="5400000" sx="-80000" sy="-18000" rotWithShape="0">
+              <a:srgbClr val="000000">
+                <a:alpha val="22000"/>
+              </a:srgbClr>
+            </a:outerShdw>
+          </a:effectLst>
+          <a:scene3d>
+            <a:camera prst="orthographicFront"/>
+            <a:lightRig rig="contrasting" dir="t">
+              <a:rot lat="0" lon="0" rev="3000000"/>
+            </a:lightRig>
+          </a:scene3d>
+          <a:sp3d contourW="7620">
+            <a:bevelT w="95250" h="31750"/>
+            <a:contourClr>
+              <a:srgbClr val="333333"/>
+            </a:contourClr>
+          </a:sp3d>
+          <a:extLst>
+            <a:ext uri="{909E8E84-426E-40DD-AFC4-6F175D3DCCD1}">
+              <a14:hiddenFill xmlns:a14="http://schemas.microsoft.com/office/drawing/2010/main">
+                <a:solidFill>
+                  <a:srgbClr val="FFFFFF"/>
+                </a:solidFill>
+              </a14:hiddenFill>
+            </a:ext>
+          </a:extLst>
+        </p:spPr>
+      </p:pic>
+      <p:sp>
+        <p:nvSpPr>
+          <p:cNvPr id="10" name="TextBox 9">
+            <a:extLst>
+              <a:ext uri="{FF2B5EF4-FFF2-40B4-BE49-F238E27FC236}">
+                <a16:creationId xmlns:a16="http://schemas.microsoft.com/office/drawing/2014/main" id="{4BA61695-1564-6BF7-3AEB-AFA36313FC9F}"/>
+              </a:ext>
+            </a:extLst>
+          </p:cNvPr>
+          <p:cNvSpPr txBox="1"/>
+          <p:nvPr/>
+        </p:nvSpPr>
+        <p:spPr>
+          <a:xfrm>
+            <a:off x="5098769" y="4428652"/>
+            <a:ext cx="1994457" cy="646331"/>
+          </a:xfrm>
+          <a:prstGeom prst="rect">
+            <a:avLst/>
+          </a:prstGeom>
+          <a:noFill/>
+        </p:spPr>
+        <p:txBody>
+          <a:bodyPr wrap="none" rtlCol="0">
+            <a:spAutoFit/>
+          </a:bodyPr>
+          <a:lstStyle/>
+          <a:p>
+            <a:r>
+              <a:rPr lang="pt-PT" dirty="0" err="1"/>
+              <a:t>Implement</a:t>
+            </a:r>
+            <a:r>
+              <a:rPr lang="pt-PT" dirty="0"/>
+              <a:t> </a:t>
+            </a:r>
+            <a:r>
+              <a:rPr lang="pt-PT" dirty="0" err="1"/>
+              <a:t>further</a:t>
+            </a:r>
+            <a:endParaRPr lang="pt-PT" dirty="0"/>
+          </a:p>
+          <a:p>
+            <a:pPr algn="ctr"/>
+            <a:r>
+              <a:rPr lang="pt-PT" dirty="0" err="1"/>
+              <a:t>Shop</a:t>
+            </a:r>
+            <a:r>
+              <a:rPr lang="pt-PT" dirty="0"/>
+              <a:t> </a:t>
+            </a:r>
+            <a:r>
+              <a:rPr lang="pt-PT" dirty="0" err="1"/>
+              <a:t>Statistics</a:t>
+            </a:r>
+            <a:endParaRPr lang="en-US" dirty="0"/>
+          </a:p>
+        </p:txBody>
+      </p:sp>
+      <p:pic>
+        <p:nvPicPr>
+          <p:cNvPr id="11" name="Picture 2">
+            <a:extLst>
+              <a:ext uri="{FF2B5EF4-FFF2-40B4-BE49-F238E27FC236}">
+                <a16:creationId xmlns:a16="http://schemas.microsoft.com/office/drawing/2014/main" id="{9E893F9F-58D9-93E1-688A-1254D626A6A5}"/>
+              </a:ext>
+            </a:extLst>
+          </p:cNvPr>
+          <p:cNvPicPr>
+            <a:picLocks noChangeAspect="1" noChangeArrowheads="1"/>
+          </p:cNvPicPr>
+          <p:nvPr/>
+        </p:nvPicPr>
+        <p:blipFill>
+          <a:blip r:embed="rId3">
+            <a:extLst>
+              <a:ext uri="{28A0092B-C50C-407E-A947-70E740481C1C}">
+                <a14:useLocalDpi xmlns:a14="http://schemas.microsoft.com/office/drawing/2010/main" val="0"/>
+              </a:ext>
+            </a:extLst>
+          </a:blip>
+          <a:srcRect/>
+          <a:stretch/>
+        </p:blipFill>
+        <p:spPr bwMode="auto">
+          <a:xfrm>
+            <a:off x="1592316" y="2339462"/>
+            <a:ext cx="1863437" cy="1863437"/>
+          </a:xfrm>
+          <a:prstGeom prst="ellipse">
+            <a:avLst/>
+          </a:prstGeom>
+          <a:ln w="3175" cap="rnd">
+            <a:solidFill>
+              <a:srgbClr val="333333"/>
+            </a:solidFill>
+          </a:ln>
+          <a:effectLst>
+            <a:outerShdw blurRad="381000" dir="5400000" sx="-80000" sy="-18000" rotWithShape="0">
+              <a:srgbClr val="000000">
+                <a:alpha val="22000"/>
+              </a:srgbClr>
+            </a:outerShdw>
+          </a:effectLst>
+          <a:scene3d>
+            <a:camera prst="orthographicFront"/>
+            <a:lightRig rig="contrasting" dir="t">
+              <a:rot lat="0" lon="0" rev="3000000"/>
+            </a:lightRig>
+          </a:scene3d>
+          <a:sp3d contourW="7620">
+            <a:bevelT w="95250" h="31750"/>
+            <a:contourClr>
+              <a:srgbClr val="333333"/>
+            </a:contourClr>
+          </a:sp3d>
+          <a:extLst>
+            <a:ext uri="{909E8E84-426E-40DD-AFC4-6F175D3DCCD1}">
+              <a14:hiddenFill xmlns:a14="http://schemas.microsoft.com/office/drawing/2010/main">
+                <a:solidFill>
+                  <a:srgbClr val="FFFFFF"/>
+                </a:solidFill>
+              </a14:hiddenFill>
+            </a:ext>
+          </a:extLst>
+        </p:spPr>
+      </p:pic>
+      <p:sp>
+        <p:nvSpPr>
+          <p:cNvPr id="12" name="TextBox 11">
+            <a:extLst>
+              <a:ext uri="{FF2B5EF4-FFF2-40B4-BE49-F238E27FC236}">
+                <a16:creationId xmlns:a16="http://schemas.microsoft.com/office/drawing/2014/main" id="{6E1D211C-BE23-FE0A-223A-7B463891DA3A}"/>
+              </a:ext>
+            </a:extLst>
+          </p:cNvPr>
+          <p:cNvSpPr txBox="1"/>
+          <p:nvPr/>
+        </p:nvSpPr>
+        <p:spPr>
+          <a:xfrm>
+            <a:off x="1067481" y="4428650"/>
+            <a:ext cx="2913105" cy="646331"/>
+          </a:xfrm>
+          <a:prstGeom prst="rect">
+            <a:avLst/>
+          </a:prstGeom>
+          <a:noFill/>
+        </p:spPr>
+        <p:txBody>
+          <a:bodyPr wrap="none" rtlCol="0">
+            <a:spAutoFit/>
+          </a:bodyPr>
+          <a:lstStyle/>
+          <a:p>
+            <a:pPr algn="ctr"/>
+            <a:r>
+              <a:rPr lang="pt-PT" dirty="0" err="1"/>
+              <a:t>Implement</a:t>
+            </a:r>
+            <a:r>
+              <a:rPr lang="pt-PT" dirty="0"/>
+              <a:t> </a:t>
+            </a:r>
+            <a:r>
+              <a:rPr lang="pt-PT" dirty="0" err="1"/>
+              <a:t>users</a:t>
+            </a:r>
+            <a:r>
+              <a:rPr lang="pt-PT" dirty="0"/>
+              <a:t>/</a:t>
+            </a:r>
+            <a:r>
+              <a:rPr lang="pt-PT" dirty="0" err="1"/>
+              <a:t>orders</a:t>
+            </a:r>
+            <a:endParaRPr lang="pt-PT" dirty="0"/>
+          </a:p>
+          <a:p>
+            <a:pPr algn="ctr"/>
+            <a:r>
+              <a:rPr lang="pt-PT" dirty="0"/>
+              <a:t>Management to </a:t>
+            </a:r>
+            <a:r>
+              <a:rPr lang="pt-PT" dirty="0" err="1"/>
+              <a:t>admin</a:t>
+            </a:r>
+            <a:r>
+              <a:rPr lang="pt-PT" dirty="0"/>
+              <a:t> </a:t>
+            </a:r>
+            <a:r>
+              <a:rPr lang="pt-PT" dirty="0" err="1"/>
+              <a:t>view</a:t>
+            </a:r>
+            <a:endParaRPr lang="en-US" dirty="0"/>
+          </a:p>
+        </p:txBody>
+      </p:sp>
+      <p:pic>
+        <p:nvPicPr>
+          <p:cNvPr id="13" name="Picture 2">
+            <a:extLst>
+              <a:ext uri="{FF2B5EF4-FFF2-40B4-BE49-F238E27FC236}">
+                <a16:creationId xmlns:a16="http://schemas.microsoft.com/office/drawing/2014/main" id="{7E82F30D-1C78-8756-6262-48FA7F80B77F}"/>
+              </a:ext>
+            </a:extLst>
+          </p:cNvPr>
+          <p:cNvPicPr>
+            <a:picLocks noChangeAspect="1" noChangeArrowheads="1"/>
+          </p:cNvPicPr>
+          <p:nvPr/>
+        </p:nvPicPr>
+        <p:blipFill>
+          <a:blip r:embed="rId4">
+            <a:extLst>
+              <a:ext uri="{28A0092B-C50C-407E-A947-70E740481C1C}">
+                <a14:useLocalDpi xmlns:a14="http://schemas.microsoft.com/office/drawing/2010/main" val="0"/>
+              </a:ext>
+            </a:extLst>
+          </a:blip>
+          <a:srcRect/>
+          <a:stretch/>
+        </p:blipFill>
+        <p:spPr bwMode="auto">
+          <a:xfrm>
+            <a:off x="8736244" y="2339461"/>
+            <a:ext cx="1863437" cy="1863437"/>
+          </a:xfrm>
+          <a:prstGeom prst="ellipse">
+            <a:avLst/>
+          </a:prstGeom>
+          <a:ln w="3175" cap="rnd">
+            <a:solidFill>
+              <a:srgbClr val="333333"/>
+            </a:solidFill>
+          </a:ln>
+          <a:effectLst>
+            <a:outerShdw blurRad="381000" dir="5400000" sx="-80000" sy="-18000" rotWithShape="0">
+              <a:srgbClr val="000000">
+                <a:alpha val="22000"/>
+              </a:srgbClr>
+            </a:outerShdw>
+          </a:effectLst>
+          <a:scene3d>
+            <a:camera prst="orthographicFront"/>
+            <a:lightRig rig="contrasting" dir="t">
+              <a:rot lat="0" lon="0" rev="3000000"/>
+            </a:lightRig>
+          </a:scene3d>
+          <a:sp3d contourW="7620">
+            <a:bevelT w="95250" h="31750"/>
+            <a:contourClr>
+              <a:srgbClr val="333333"/>
+            </a:contourClr>
+          </a:sp3d>
+          <a:extLst>
+            <a:ext uri="{909E8E84-426E-40DD-AFC4-6F175D3DCCD1}">
+              <a14:hiddenFill xmlns:a14="http://schemas.microsoft.com/office/drawing/2010/main">
+                <a:solidFill>
+                  <a:srgbClr val="FFFFFF"/>
+                </a:solidFill>
+              </a14:hiddenFill>
+            </a:ext>
+          </a:extLst>
+        </p:spPr>
+      </p:pic>
+      <p:sp>
+        <p:nvSpPr>
+          <p:cNvPr id="14" name="TextBox 13">
+            <a:extLst>
+              <a:ext uri="{FF2B5EF4-FFF2-40B4-BE49-F238E27FC236}">
+                <a16:creationId xmlns:a16="http://schemas.microsoft.com/office/drawing/2014/main" id="{0C3B00C7-63C4-DA66-7B6D-DC0A9C78515F}"/>
+              </a:ext>
+            </a:extLst>
+          </p:cNvPr>
+          <p:cNvSpPr txBox="1"/>
+          <p:nvPr/>
+        </p:nvSpPr>
+        <p:spPr>
+          <a:xfrm>
+            <a:off x="8621105" y="4428651"/>
+            <a:ext cx="2093714" cy="646331"/>
+          </a:xfrm>
+          <a:prstGeom prst="rect">
+            <a:avLst/>
+          </a:prstGeom>
+          <a:noFill/>
+        </p:spPr>
+        <p:txBody>
+          <a:bodyPr wrap="none" rtlCol="0">
+            <a:spAutoFit/>
+          </a:bodyPr>
+          <a:lstStyle/>
+          <a:p>
+            <a:pPr algn="ctr"/>
+            <a:r>
+              <a:rPr lang="pt-PT" dirty="0" err="1"/>
+              <a:t>Allow</a:t>
+            </a:r>
+            <a:r>
+              <a:rPr lang="pt-PT" dirty="0"/>
+              <a:t> </a:t>
+            </a:r>
+            <a:r>
+              <a:rPr lang="pt-PT" dirty="0" err="1"/>
+              <a:t>users</a:t>
+            </a:r>
+            <a:r>
+              <a:rPr lang="pt-PT" dirty="0"/>
+              <a:t> to </a:t>
+            </a:r>
+            <a:r>
+              <a:rPr lang="pt-PT" dirty="0" err="1"/>
+              <a:t>have</a:t>
+            </a:r>
+            <a:endParaRPr lang="pt-PT" dirty="0"/>
+          </a:p>
+          <a:p>
+            <a:pPr algn="ctr"/>
+            <a:r>
+              <a:rPr lang="pt-PT" dirty="0"/>
+              <a:t> a role as a </a:t>
+            </a:r>
+            <a:r>
+              <a:rPr lang="pt-PT" dirty="0" err="1"/>
+              <a:t>Seller</a:t>
+            </a:r>
+            <a:endParaRPr lang="en-US" dirty="0"/>
+          </a:p>
+        </p:txBody>
+      </p:sp>
+    </p:spTree>
+    <p:extLst>
+      <p:ext uri="{BB962C8B-B14F-4D97-AF65-F5344CB8AC3E}">
+        <p14:creationId xmlns:p14="http://schemas.microsoft.com/office/powerpoint/2010/main" val="4199402213"/>
+      </p:ext>
+    </p:extLst>
+  </p:cSld>
+  <p:clrMapOvr>
+    <a:masterClrMapping/>
+  </p:clrMapOvr>
+</p:sld>
+</file>
+
 <file path=ppt/slides/slide2.xml><?xml version="1.0" encoding="utf-8"?>
 <p:sld xmlns:a="http://schemas.openxmlformats.org/drawingml/2006/main" xmlns:r="http://schemas.openxmlformats.org/officeDocument/2006/relationships" xmlns:p="http://schemas.openxmlformats.org/presentationml/2006/main">
   <p:cSld>
@@ -7853,8 +8991,8 @@
         </p:nvSpPr>
         <p:spPr>
           <a:xfrm>
-            <a:off x="329997" y="3684147"/>
-            <a:ext cx="1266356" cy="824555"/>
+            <a:off x="2950570" y="3507743"/>
+            <a:ext cx="2878880" cy="824555"/>
           </a:xfrm>
           <a:prstGeom prst="rect">
             <a:avLst/>
@@ -7924,8 +9062,8 @@
         </p:nvSpPr>
         <p:spPr>
           <a:xfrm>
-            <a:off x="3853807" y="1739049"/>
-            <a:ext cx="2472852" cy="824555"/>
+            <a:off x="6096000" y="2215978"/>
+            <a:ext cx="2622758" cy="824555"/>
           </a:xfrm>
           <a:prstGeom prst="rect">
             <a:avLst/>
@@ -7959,6 +9097,7 @@
           <a:bodyPr rtlCol="0" anchor="ctr"/>
           <a:lstStyle/>
           <a:p>
+            <a:pPr algn="ctr"/>
             <a:r>
               <a:rPr lang="pt-PT" sz="3200" b="1" dirty="0" err="1">
                 <a:solidFill>
@@ -8000,8 +9139,8 @@
         </p:nvSpPr>
         <p:spPr>
           <a:xfrm>
-            <a:off x="329997" y="1741105"/>
-            <a:ext cx="1266356" cy="824555"/>
+            <a:off x="468551" y="2211990"/>
+            <a:ext cx="2160054" cy="824555"/>
           </a:xfrm>
           <a:prstGeom prst="rect">
             <a:avLst/>
@@ -8082,7 +9221,7 @@
         <p:spPr>
           <a:xfrm>
             <a:off x="838200" y="365125"/>
-            <a:ext cx="10515600" cy="1325563"/>
+            <a:ext cx="5257800" cy="1325563"/>
           </a:xfrm>
         </p:spPr>
         <p:txBody>
@@ -8303,8 +9442,8 @@
         </p:nvSpPr>
         <p:spPr>
           <a:xfrm>
-            <a:off x="329997" y="2237806"/>
-            <a:ext cx="3111947" cy="1281927"/>
+            <a:off x="468552" y="2708691"/>
+            <a:ext cx="2160054" cy="1281927"/>
           </a:xfrm>
           <a:prstGeom prst="rect">
             <a:avLst/>
@@ -8367,6 +9506,44 @@
               </a:rPr>
               <a:t>CompleteUserData</a:t>
             </a:r>
+            <a:endParaRPr lang="pt-PT" dirty="0">
+              <a:solidFill>
+                <a:schemeClr val="tx1"/>
+              </a:solidFill>
+              <a:latin typeface="Arial" panose="020B0604020202020204" pitchFamily="34" charset="0"/>
+              <a:cs typeface="Arial" panose="020B0604020202020204" pitchFamily="34" charset="0"/>
+            </a:endParaRPr>
+          </a:p>
+          <a:p>
+            <a:r>
+              <a:rPr lang="pt-PT" dirty="0" err="1">
+                <a:solidFill>
+                  <a:schemeClr val="tx1"/>
+                </a:solidFill>
+                <a:latin typeface="Arial" panose="020B0604020202020204" pitchFamily="34" charset="0"/>
+                <a:cs typeface="Arial" panose="020B0604020202020204" pitchFamily="34" charset="0"/>
+              </a:rPr>
+              <a:t>Users_admin</a:t>
+            </a:r>
+            <a:endParaRPr lang="pt-PT" dirty="0">
+              <a:solidFill>
+                <a:schemeClr val="tx1"/>
+              </a:solidFill>
+              <a:latin typeface="Arial" panose="020B0604020202020204" pitchFamily="34" charset="0"/>
+              <a:cs typeface="Arial" panose="020B0604020202020204" pitchFamily="34" charset="0"/>
+            </a:endParaRPr>
+          </a:p>
+          <a:p>
+            <a:r>
+              <a:rPr lang="pt-PT" dirty="0" err="1">
+                <a:solidFill>
+                  <a:schemeClr val="tx1"/>
+                </a:solidFill>
+                <a:latin typeface="Arial" panose="020B0604020202020204" pitchFamily="34" charset="0"/>
+                <a:cs typeface="Arial" panose="020B0604020202020204" pitchFamily="34" charset="0"/>
+              </a:rPr>
+              <a:t>Users_clients</a:t>
+            </a:r>
             <a:endParaRPr lang="en-US" dirty="0">
               <a:solidFill>
                 <a:schemeClr val="tx1"/>
@@ -8578,7 +9755,7 @@
         </p:nvSpPr>
         <p:spPr>
           <a:xfrm>
-            <a:off x="330000" y="4197750"/>
+            <a:off x="2950573" y="4021346"/>
             <a:ext cx="2878880" cy="1788462"/>
           </a:xfrm>
           <a:prstGeom prst="rect">
@@ -8622,7 +9799,7 @@
                 <a:ea typeface="Calibri Light" panose="020F0302020204030204" pitchFamily="34" charset="0"/>
                 <a:cs typeface="Arial" panose="020B0604020202020204" pitchFamily="34" charset="0"/>
               </a:rPr>
-              <a:t>searchProducts</a:t>
+              <a:t>searchAvailableProducts</a:t>
             </a:r>
             <a:endParaRPr lang="pt-PT" dirty="0">
               <a:solidFill>
@@ -8708,6 +9885,27 @@
               </a:rPr>
               <a:t>getMonthlySalesTable</a:t>
             </a:r>
+            <a:endParaRPr lang="pt-PT" dirty="0">
+              <a:solidFill>
+                <a:schemeClr val="tx1"/>
+              </a:solidFill>
+              <a:latin typeface="Arial" panose="020B0604020202020204" pitchFamily="34" charset="0"/>
+              <a:ea typeface="Calibri Light" panose="020F0302020204030204" pitchFamily="34" charset="0"/>
+              <a:cs typeface="Arial" panose="020B0604020202020204" pitchFamily="34" charset="0"/>
+            </a:endParaRPr>
+          </a:p>
+          <a:p>
+            <a:r>
+              <a:rPr lang="pt-PT" dirty="0" err="1">
+                <a:solidFill>
+                  <a:schemeClr val="tx1"/>
+                </a:solidFill>
+                <a:latin typeface="Arial" panose="020B0604020202020204" pitchFamily="34" charset="0"/>
+                <a:ea typeface="Calibri Light" panose="020F0302020204030204" pitchFamily="34" charset="0"/>
+                <a:cs typeface="Arial" panose="020B0604020202020204" pitchFamily="34" charset="0"/>
+              </a:rPr>
+              <a:t>isAdmin</a:t>
+            </a:r>
             <a:r>
               <a:rPr lang="pt-PT" dirty="0">
                 <a:solidFill>
@@ -8736,7 +9934,7 @@
         </p:nvSpPr>
         <p:spPr>
           <a:xfrm>
-            <a:off x="3853807" y="2237806"/>
+            <a:off x="6096000" y="2714735"/>
             <a:ext cx="2622758" cy="1281927"/>
           </a:xfrm>
           <a:prstGeom prst="rect">
@@ -8849,8 +10047,8 @@
         </p:nvSpPr>
         <p:spPr>
           <a:xfrm>
-            <a:off x="7229186" y="3701049"/>
-            <a:ext cx="1556468" cy="824555"/>
+            <a:off x="9208091" y="3507743"/>
+            <a:ext cx="2557365" cy="824555"/>
           </a:xfrm>
           <a:prstGeom prst="rect">
             <a:avLst/>
@@ -8926,7 +10124,7 @@
         </p:nvSpPr>
         <p:spPr>
           <a:xfrm>
-            <a:off x="7229186" y="4197750"/>
+            <a:off x="9208092" y="4004444"/>
             <a:ext cx="2557365" cy="1281927"/>
           </a:xfrm>
           <a:prstGeom prst="rect">
@@ -8989,6 +10187,25 @@
                 <a:cs typeface="Arial" panose="020B0604020202020204" pitchFamily="34" charset="0"/>
               </a:rPr>
               <a:t>updateTotalOrderPrice</a:t>
+            </a:r>
+            <a:endParaRPr lang="pt-PT" dirty="0">
+              <a:solidFill>
+                <a:schemeClr val="tx1"/>
+              </a:solidFill>
+              <a:latin typeface="Arial" panose="020B0604020202020204" pitchFamily="34" charset="0"/>
+              <a:cs typeface="Arial" panose="020B0604020202020204" pitchFamily="34" charset="0"/>
+            </a:endParaRPr>
+          </a:p>
+          <a:p>
+            <a:r>
+              <a:rPr lang="pt-PT" dirty="0" err="1">
+                <a:solidFill>
+                  <a:schemeClr val="tx1"/>
+                </a:solidFill>
+                <a:latin typeface="Arial" panose="020B0604020202020204" pitchFamily="34" charset="0"/>
+                <a:cs typeface="Arial" panose="020B0604020202020204" pitchFamily="34" charset="0"/>
+              </a:rPr>
+              <a:t>deleteZeroItemsCart</a:t>
             </a:r>
             <a:endParaRPr lang="en-US" dirty="0">
               <a:solidFill>
@@ -9543,14 +10760,585 @@
               <a:rPr lang="pt-PT" sz="2000" dirty="0" err="1"/>
               <a:t>index’s</a:t>
             </a:r>
-            <a:r>
-              <a:rPr lang="pt-PT" sz="2000" dirty="0"/>
-              <a:t>:</a:t>
-            </a:r>
             <a:endParaRPr lang="en-US" sz="2000" dirty="0"/>
           </a:p>
         </p:txBody>
       </p:sp>
+      <p:graphicFrame>
+        <p:nvGraphicFramePr>
+          <p:cNvPr id="12" name="Table 11">
+            <a:extLst>
+              <a:ext uri="{FF2B5EF4-FFF2-40B4-BE49-F238E27FC236}">
+                <a16:creationId xmlns:a16="http://schemas.microsoft.com/office/drawing/2014/main" id="{E751F150-472D-C452-F12E-E269FB39C2DD}"/>
+              </a:ext>
+            </a:extLst>
+          </p:cNvPr>
+          <p:cNvGraphicFramePr>
+            <a:graphicFrameLocks noGrp="1"/>
+          </p:cNvGraphicFramePr>
+          <p:nvPr>
+            <p:extLst>
+              <p:ext uri="{D42A27DB-BD31-4B8C-83A1-F6EECF244321}">
+                <p14:modId xmlns:p14="http://schemas.microsoft.com/office/powerpoint/2010/main" val="904333518"/>
+              </p:ext>
+            </p:extLst>
+          </p:nvPr>
+        </p:nvGraphicFramePr>
+        <p:xfrm>
+          <a:off x="1402493" y="2637111"/>
+          <a:ext cx="9387011" cy="3239442"/>
+        </p:xfrm>
+        <a:graphic>
+          <a:graphicData uri="http://schemas.openxmlformats.org/drawingml/2006/table">
+            <a:tbl>
+              <a:tblPr firstRow="1" bandRow="1">
+                <a:tableStyleId>{073A0DAA-6AF3-43AB-8588-CEC1D06C72B9}</a:tableStyleId>
+              </a:tblPr>
+              <a:tblGrid>
+                <a:gridCol w="2927758">
+                  <a:extLst>
+                    <a:ext uri="{9D8B030D-6E8A-4147-A177-3AD203B41FA5}">
+                      <a16:colId xmlns:a16="http://schemas.microsoft.com/office/drawing/2014/main" val="3539102218"/>
+                    </a:ext>
+                  </a:extLst>
+                </a:gridCol>
+                <a:gridCol w="3330249">
+                  <a:extLst>
+                    <a:ext uri="{9D8B030D-6E8A-4147-A177-3AD203B41FA5}">
+                      <a16:colId xmlns:a16="http://schemas.microsoft.com/office/drawing/2014/main" val="20419117"/>
+                    </a:ext>
+                  </a:extLst>
+                </a:gridCol>
+                <a:gridCol w="3129004">
+                  <a:extLst>
+                    <a:ext uri="{9D8B030D-6E8A-4147-A177-3AD203B41FA5}">
+                      <a16:colId xmlns:a16="http://schemas.microsoft.com/office/drawing/2014/main" val="1242253140"/>
+                    </a:ext>
+                  </a:extLst>
+                </a:gridCol>
+              </a:tblGrid>
+              <a:tr h="643562">
+                <a:tc>
+                  <a:txBody>
+                    <a:bodyPr/>
+                    <a:lstStyle/>
+                    <a:p>
+                      <a:pPr algn="ctr"/>
+                      <a:r>
+                        <a:rPr lang="pt-PT" dirty="0" err="1"/>
+                        <a:t>Table</a:t>
+                      </a:r>
+                      <a:endParaRPr lang="en-US" dirty="0"/>
+                    </a:p>
+                  </a:txBody>
+                  <a:tcPr anchor="ctr"/>
+                </a:tc>
+                <a:tc>
+                  <a:txBody>
+                    <a:bodyPr/>
+                    <a:lstStyle/>
+                    <a:p>
+                      <a:pPr algn="ctr"/>
+                      <a:r>
+                        <a:rPr lang="pt-PT" dirty="0"/>
+                        <a:t>CLUSTERED INDEX’S </a:t>
+                      </a:r>
+                      <a:br>
+                        <a:rPr lang="pt-PT" dirty="0"/>
+                      </a:br>
+                      <a:r>
+                        <a:rPr lang="pt-PT" dirty="0"/>
+                        <a:t>(</a:t>
+                      </a:r>
+                      <a:r>
+                        <a:rPr lang="pt-PT" dirty="0" err="1"/>
+                        <a:t>Primary</a:t>
+                      </a:r>
+                      <a:r>
+                        <a:rPr lang="pt-PT" dirty="0"/>
+                        <a:t> </a:t>
+                      </a:r>
+                      <a:r>
+                        <a:rPr lang="pt-PT" dirty="0" err="1"/>
+                        <a:t>Keys</a:t>
+                      </a:r>
+                      <a:r>
+                        <a:rPr lang="pt-PT" dirty="0"/>
+                        <a:t>)</a:t>
+                      </a:r>
+                      <a:endParaRPr lang="en-US" dirty="0"/>
+                    </a:p>
+                  </a:txBody>
+                  <a:tcPr anchor="ctr"/>
+                </a:tc>
+                <a:tc>
+                  <a:txBody>
+                    <a:bodyPr/>
+                    <a:lstStyle/>
+                    <a:p>
+                      <a:pPr algn="ctr"/>
+                      <a:r>
+                        <a:rPr lang="pt-PT" dirty="0"/>
+                        <a:t>NON-CLUSTERED INDEX</a:t>
+                      </a:r>
+                      <a:endParaRPr lang="en-US" dirty="0"/>
+                    </a:p>
+                  </a:txBody>
+                  <a:tcPr anchor="ctr"/>
+                </a:tc>
+                <a:extLst>
+                  <a:ext uri="{0D108BD9-81ED-4DB2-BD59-A6C34878D82A}">
+                    <a16:rowId xmlns:a16="http://schemas.microsoft.com/office/drawing/2014/main" val="2523156938"/>
+                  </a:ext>
+                </a:extLst>
+              </a:tr>
+              <a:tr h="370840">
+                <a:tc>
+                  <a:txBody>
+                    <a:bodyPr/>
+                    <a:lstStyle/>
+                    <a:p>
+                      <a:pPr algn="ctr"/>
+                      <a:r>
+                        <a:rPr lang="pt-PT" dirty="0"/>
+                        <a:t>USERS</a:t>
+                      </a:r>
+                      <a:endParaRPr lang="en-US" dirty="0"/>
+                    </a:p>
+                  </a:txBody>
+                  <a:tcPr anchor="ctr"/>
+                </a:tc>
+                <a:tc>
+                  <a:txBody>
+                    <a:bodyPr/>
+                    <a:lstStyle/>
+                    <a:p>
+                      <a:pPr algn="ctr"/>
+                      <a:r>
+                        <a:rPr lang="pt-PT" dirty="0" err="1"/>
+                        <a:t>user_id</a:t>
+                      </a:r>
+                      <a:endParaRPr lang="en-US" dirty="0"/>
+                    </a:p>
+                  </a:txBody>
+                  <a:tcPr anchor="ctr"/>
+                </a:tc>
+                <a:tc>
+                  <a:txBody>
+                    <a:bodyPr/>
+                    <a:lstStyle/>
+                    <a:p>
+                      <a:pPr algn="ctr"/>
+                      <a:r>
+                        <a:rPr lang="pt-PT" dirty="0" err="1"/>
+                        <a:t>username</a:t>
+                      </a:r>
+                      <a:endParaRPr lang="en-US" dirty="0"/>
+                    </a:p>
+                  </a:txBody>
+                  <a:tcPr anchor="ctr"/>
+                </a:tc>
+                <a:extLst>
+                  <a:ext uri="{0D108BD9-81ED-4DB2-BD59-A6C34878D82A}">
+                    <a16:rowId xmlns:a16="http://schemas.microsoft.com/office/drawing/2014/main" val="2986097921"/>
+                  </a:ext>
+                </a:extLst>
+              </a:tr>
+              <a:tr h="370840">
+                <a:tc>
+                  <a:txBody>
+                    <a:bodyPr/>
+                    <a:lstStyle/>
+                    <a:p>
+                      <a:pPr algn="ctr"/>
+                      <a:r>
+                        <a:rPr lang="pt-PT" dirty="0"/>
+                        <a:t>PRODUCTS</a:t>
+                      </a:r>
+                    </a:p>
+                  </a:txBody>
+                  <a:tcPr anchor="ctr"/>
+                </a:tc>
+                <a:tc>
+                  <a:txBody>
+                    <a:bodyPr/>
+                    <a:lstStyle/>
+                    <a:p>
+                      <a:pPr algn="ctr"/>
+                      <a:r>
+                        <a:rPr lang="pt-PT" dirty="0" err="1"/>
+                        <a:t>product_id</a:t>
+                      </a:r>
+                      <a:endParaRPr lang="en-US" dirty="0"/>
+                    </a:p>
+                  </a:txBody>
+                  <a:tcPr anchor="ctr"/>
+                </a:tc>
+                <a:tc>
+                  <a:txBody>
+                    <a:bodyPr/>
+                    <a:lstStyle/>
+                    <a:p>
+                      <a:pPr algn="ctr"/>
+                      <a:r>
+                        <a:rPr lang="pt-PT" dirty="0" err="1"/>
+                        <a:t>product_name</a:t>
+                      </a:r>
+                      <a:r>
+                        <a:rPr lang="pt-PT" dirty="0"/>
+                        <a:t> </a:t>
+                      </a:r>
+                      <a:r>
+                        <a:rPr lang="pt-PT" dirty="0" err="1"/>
+                        <a:t>and</a:t>
+                      </a:r>
+                      <a:r>
+                        <a:rPr lang="pt-PT" dirty="0"/>
+                        <a:t> </a:t>
+                      </a:r>
+                      <a:r>
+                        <a:rPr lang="pt-PT" dirty="0" err="1"/>
+                        <a:t>category</a:t>
+                      </a:r>
+                      <a:endParaRPr lang="en-US" dirty="0"/>
+                    </a:p>
+                  </a:txBody>
+                  <a:tcPr anchor="ctr"/>
+                </a:tc>
+                <a:extLst>
+                  <a:ext uri="{0D108BD9-81ED-4DB2-BD59-A6C34878D82A}">
+                    <a16:rowId xmlns:a16="http://schemas.microsoft.com/office/drawing/2014/main" val="552697344"/>
+                  </a:ext>
+                </a:extLst>
+              </a:tr>
+              <a:tr h="370840">
+                <a:tc>
+                  <a:txBody>
+                    <a:bodyPr/>
+                    <a:lstStyle/>
+                    <a:p>
+                      <a:pPr marL="0" marR="0" lvl="0" indent="0" algn="ctr" defTabSz="914400" rtl="0" eaLnBrk="1" fontAlgn="auto" latinLnBrk="0" hangingPunct="1">
+                        <a:lnSpc>
+                          <a:spcPct val="100000"/>
+                        </a:lnSpc>
+                        <a:spcBef>
+                          <a:spcPts val="0"/>
+                        </a:spcBef>
+                        <a:spcAft>
+                          <a:spcPts val="0"/>
+                        </a:spcAft>
+                        <a:buClrTx/>
+                        <a:buSzTx/>
+                        <a:buFontTx/>
+                        <a:buNone/>
+                        <a:tabLst/>
+                        <a:defRPr/>
+                      </a:pPr>
+                      <a:r>
+                        <a:rPr lang="pt-PT" dirty="0"/>
+                        <a:t>ORDERS</a:t>
+                      </a:r>
+                      <a:endParaRPr lang="en-US" dirty="0"/>
+                    </a:p>
+                  </a:txBody>
+                  <a:tcPr anchor="ctr"/>
+                </a:tc>
+                <a:tc>
+                  <a:txBody>
+                    <a:bodyPr/>
+                    <a:lstStyle/>
+                    <a:p>
+                      <a:pPr algn="ctr"/>
+                      <a:r>
+                        <a:rPr lang="pt-PT" dirty="0" err="1"/>
+                        <a:t>order_id</a:t>
+                      </a:r>
+                      <a:endParaRPr lang="en-US" dirty="0"/>
+                    </a:p>
+                  </a:txBody>
+                  <a:tcPr anchor="ctr"/>
+                </a:tc>
+                <a:tc>
+                  <a:txBody>
+                    <a:bodyPr/>
+                    <a:lstStyle/>
+                    <a:p>
+                      <a:pPr algn="ctr"/>
+                      <a:r>
+                        <a:rPr lang="pt-PT" dirty="0" err="1"/>
+                        <a:t>user_id</a:t>
+                      </a:r>
+                      <a:endParaRPr lang="en-US" dirty="0"/>
+                    </a:p>
+                  </a:txBody>
+                  <a:tcPr anchor="ctr"/>
+                </a:tc>
+                <a:extLst>
+                  <a:ext uri="{0D108BD9-81ED-4DB2-BD59-A6C34878D82A}">
+                    <a16:rowId xmlns:a16="http://schemas.microsoft.com/office/drawing/2014/main" val="2989703836"/>
+                  </a:ext>
+                </a:extLst>
+              </a:tr>
+              <a:tr h="370840">
+                <a:tc>
+                  <a:txBody>
+                    <a:bodyPr/>
+                    <a:lstStyle/>
+                    <a:p>
+                      <a:pPr algn="ctr"/>
+                      <a:r>
+                        <a:rPr lang="pt-PT" dirty="0"/>
+                        <a:t>PRODUCTS_ORDERED</a:t>
+                      </a:r>
+                      <a:endParaRPr lang="en-US" dirty="0"/>
+                    </a:p>
+                  </a:txBody>
+                  <a:tcPr anchor="ctr"/>
+                </a:tc>
+                <a:tc>
+                  <a:txBody>
+                    <a:bodyPr/>
+                    <a:lstStyle/>
+                    <a:p>
+                      <a:pPr algn="ctr"/>
+                      <a:r>
+                        <a:rPr lang="pt-PT" dirty="0"/>
+                        <a:t>(</a:t>
+                      </a:r>
+                      <a:r>
+                        <a:rPr lang="pt-PT" dirty="0" err="1"/>
+                        <a:t>order_od</a:t>
+                      </a:r>
+                      <a:r>
+                        <a:rPr lang="pt-PT" dirty="0"/>
+                        <a:t>, </a:t>
+                      </a:r>
+                      <a:r>
+                        <a:rPr lang="pt-PT" dirty="0" err="1"/>
+                        <a:t>product_id</a:t>
+                      </a:r>
+                      <a:r>
+                        <a:rPr lang="pt-PT" dirty="0"/>
+                        <a:t>)</a:t>
+                      </a:r>
+                      <a:endParaRPr lang="en-US" dirty="0"/>
+                    </a:p>
+                  </a:txBody>
+                  <a:tcPr anchor="ctr"/>
+                </a:tc>
+                <a:tc>
+                  <a:txBody>
+                    <a:bodyPr/>
+                    <a:lstStyle/>
+                    <a:p>
+                      <a:pPr algn="ctr"/>
+                      <a:r>
+                        <a:rPr lang="pt-PT" dirty="0" err="1"/>
+                        <a:t>None</a:t>
+                      </a:r>
+                      <a:endParaRPr lang="en-US" dirty="0"/>
+                    </a:p>
+                  </a:txBody>
+                  <a:tcPr anchor="ctr"/>
+                </a:tc>
+                <a:extLst>
+                  <a:ext uri="{0D108BD9-81ED-4DB2-BD59-A6C34878D82A}">
+                    <a16:rowId xmlns:a16="http://schemas.microsoft.com/office/drawing/2014/main" val="1378083884"/>
+                  </a:ext>
+                </a:extLst>
+              </a:tr>
+              <a:tr h="370840">
+                <a:tc>
+                  <a:txBody>
+                    <a:bodyPr/>
+                    <a:lstStyle/>
+                    <a:p>
+                      <a:pPr algn="ctr"/>
+                      <a:r>
+                        <a:rPr lang="pt-PT" dirty="0"/>
+                        <a:t>CARTS</a:t>
+                      </a:r>
+                      <a:endParaRPr lang="en-US" dirty="0"/>
+                    </a:p>
+                  </a:txBody>
+                  <a:tcPr anchor="ctr"/>
+                </a:tc>
+                <a:tc>
+                  <a:txBody>
+                    <a:bodyPr/>
+                    <a:lstStyle/>
+                    <a:p>
+                      <a:pPr algn="ctr"/>
+                      <a:r>
+                        <a:rPr lang="pt-PT" dirty="0"/>
+                        <a:t>(</a:t>
+                      </a:r>
+                      <a:r>
+                        <a:rPr lang="pt-PT" dirty="0" err="1"/>
+                        <a:t>user_id</a:t>
+                      </a:r>
+                      <a:r>
+                        <a:rPr lang="pt-PT" dirty="0"/>
+                        <a:t>, </a:t>
+                      </a:r>
+                      <a:r>
+                        <a:rPr lang="pt-PT" dirty="0" err="1"/>
+                        <a:t>product_id</a:t>
+                      </a:r>
+                      <a:r>
+                        <a:rPr lang="pt-PT" dirty="0"/>
+                        <a:t>)</a:t>
+                      </a:r>
+                      <a:endParaRPr lang="en-US" dirty="0"/>
+                    </a:p>
+                  </a:txBody>
+                  <a:tcPr anchor="ctr"/>
+                </a:tc>
+                <a:tc>
+                  <a:txBody>
+                    <a:bodyPr/>
+                    <a:lstStyle/>
+                    <a:p>
+                      <a:pPr algn="ctr"/>
+                      <a:r>
+                        <a:rPr lang="pt-PT" dirty="0" err="1"/>
+                        <a:t>None</a:t>
+                      </a:r>
+                      <a:endParaRPr lang="en-US" dirty="0"/>
+                    </a:p>
+                  </a:txBody>
+                  <a:tcPr anchor="ctr"/>
+                </a:tc>
+                <a:extLst>
+                  <a:ext uri="{0D108BD9-81ED-4DB2-BD59-A6C34878D82A}">
+                    <a16:rowId xmlns:a16="http://schemas.microsoft.com/office/drawing/2014/main" val="476010625"/>
+                  </a:ext>
+                </a:extLst>
+              </a:tr>
+              <a:tr h="370840">
+                <a:tc>
+                  <a:txBody>
+                    <a:bodyPr/>
+                    <a:lstStyle/>
+                    <a:p>
+                      <a:pPr algn="ctr"/>
+                      <a:r>
+                        <a:rPr lang="pt-PT" dirty="0"/>
+                        <a:t>REVIEWS</a:t>
+                      </a:r>
+                      <a:endParaRPr lang="en-US" dirty="0"/>
+                    </a:p>
+                  </a:txBody>
+                  <a:tcPr anchor="ctr"/>
+                </a:tc>
+                <a:tc>
+                  <a:txBody>
+                    <a:bodyPr/>
+                    <a:lstStyle/>
+                    <a:p>
+                      <a:pPr algn="ctr"/>
+                      <a:r>
+                        <a:rPr lang="pt-PT" dirty="0" err="1"/>
+                        <a:t>review_id</a:t>
+                      </a:r>
+                      <a:endParaRPr lang="en-US" dirty="0"/>
+                    </a:p>
+                  </a:txBody>
+                  <a:tcPr anchor="ctr"/>
+                </a:tc>
+                <a:tc>
+                  <a:txBody>
+                    <a:bodyPr/>
+                    <a:lstStyle/>
+                    <a:p>
+                      <a:pPr algn="ctr"/>
+                      <a:r>
+                        <a:rPr lang="pt-PT" dirty="0" err="1"/>
+                        <a:t>product_id</a:t>
+                      </a:r>
+                      <a:endParaRPr lang="en-US" dirty="0"/>
+                    </a:p>
+                  </a:txBody>
+                  <a:tcPr anchor="ctr"/>
+                </a:tc>
+                <a:extLst>
+                  <a:ext uri="{0D108BD9-81ED-4DB2-BD59-A6C34878D82A}">
+                    <a16:rowId xmlns:a16="http://schemas.microsoft.com/office/drawing/2014/main" val="3423497978"/>
+                  </a:ext>
+                </a:extLst>
+              </a:tr>
+              <a:tr h="370840">
+                <a:tc>
+                  <a:txBody>
+                    <a:bodyPr/>
+                    <a:lstStyle/>
+                    <a:p>
+                      <a:pPr algn="ctr"/>
+                      <a:r>
+                        <a:rPr lang="pt-PT" dirty="0"/>
+                        <a:t>EMERGENCY_CODES</a:t>
+                      </a:r>
+                      <a:endParaRPr lang="en-US" dirty="0"/>
+                    </a:p>
+                  </a:txBody>
+                  <a:tcPr anchor="ctr"/>
+                </a:tc>
+                <a:tc>
+                  <a:txBody>
+                    <a:bodyPr/>
+                    <a:lstStyle/>
+                    <a:p>
+                      <a:pPr algn="ctr"/>
+                      <a:r>
+                        <a:rPr lang="pt-PT" dirty="0"/>
+                        <a:t>(</a:t>
+                      </a:r>
+                      <a:r>
+                        <a:rPr lang="pt-PT" dirty="0" err="1"/>
+                        <a:t>user_id</a:t>
+                      </a:r>
+                      <a:r>
+                        <a:rPr lang="pt-PT" dirty="0"/>
+                        <a:t>, </a:t>
+                      </a:r>
+                      <a:r>
+                        <a:rPr lang="pt-PT" dirty="0" err="1"/>
+                        <a:t>emergency_code</a:t>
+                      </a:r>
+                      <a:r>
+                        <a:rPr lang="pt-PT" dirty="0"/>
+                        <a:t>)</a:t>
+                      </a:r>
+                      <a:endParaRPr lang="en-US" dirty="0"/>
+                    </a:p>
+                  </a:txBody>
+                  <a:tcPr anchor="ctr"/>
+                </a:tc>
+                <a:tc>
+                  <a:txBody>
+                    <a:bodyPr/>
+                    <a:lstStyle/>
+                    <a:p>
+                      <a:pPr algn="ctr"/>
+                      <a:r>
+                        <a:rPr lang="pt-PT" dirty="0" err="1"/>
+                        <a:t>None</a:t>
+                      </a:r>
+                      <a:endParaRPr lang="en-US" dirty="0"/>
+                    </a:p>
+                  </a:txBody>
+                  <a:tcPr anchor="ctr"/>
+                </a:tc>
+                <a:extLst>
+                  <a:ext uri="{0D108BD9-81ED-4DB2-BD59-A6C34878D82A}">
+                    <a16:rowId xmlns:a16="http://schemas.microsoft.com/office/drawing/2014/main" val="706731443"/>
+                  </a:ext>
+                </a:extLst>
+              </a:tr>
+            </a:tbl>
+          </a:graphicData>
+        </a:graphic>
+      </p:graphicFrame>
     </p:spTree>
     <p:extLst>
       <p:ext uri="{BB962C8B-B14F-4D97-AF65-F5344CB8AC3E}">

</xml_diff>